<commit_message>
Refactor, fix stuff, do more stuff and such
</commit_message>
<xml_diff>
--- a/sort-2017-java9.pptx
+++ b/sort-2017-java9.pptx
@@ -5,7 +5,7 @@
     <p:sldMasterId id="2147483690" r:id="rId1"/>
   </p:sldMasterIdLst>
   <p:notesMasterIdLst>
-    <p:notesMasterId r:id="rId20"/>
+    <p:notesMasterId r:id="rId22"/>
   </p:notesMasterIdLst>
   <p:sldIdLst>
     <p:sldId id="256" r:id="rId2"/>
@@ -24,8 +24,10 @@
     <p:sldId id="279" r:id="rId15"/>
     <p:sldId id="278" r:id="rId16"/>
     <p:sldId id="277" r:id="rId17"/>
-    <p:sldId id="283" r:id="rId18"/>
-    <p:sldId id="262" r:id="rId19"/>
+    <p:sldId id="284" r:id="rId18"/>
+    <p:sldId id="283" r:id="rId19"/>
+    <p:sldId id="285" r:id="rId20"/>
+    <p:sldId id="262" r:id="rId21"/>
   </p:sldIdLst>
   <p:sldSz cx="12192000" cy="6858000"/>
   <p:notesSz cx="6858000" cy="9144000"/>
@@ -214,7 +216,7 @@
           <a:p>
             <a:fld id="{89352B6C-D4C9-47F9-89DC-3AEEFB041037}" type="datetimeFigureOut">
               <a:rPr lang="en-US" smtClean="0"/>
-              <a:t>9/6/2017</a:t>
+              <a:t>9/22/2017</a:t>
             </a:fld>
             <a:endParaRPr lang="en-US"/>
           </a:p>
@@ -630,7 +632,7 @@
           <a:p>
             <a:fld id="{096B5631-8577-E648-B608-389A859B729B}" type="datetimeFigureOut">
               <a:rPr lang="en-US" smtClean="0"/>
-              <a:t>9/6/2017</a:t>
+              <a:t>9/22/2017</a:t>
             </a:fld>
             <a:endParaRPr lang="en-US"/>
           </a:p>
@@ -1006,7 +1008,7 @@
           <a:p>
             <a:fld id="{096B5631-8577-E648-B608-389A859B729B}" type="datetimeFigureOut">
               <a:rPr lang="en-US" smtClean="0"/>
-              <a:t>9/6/2017</a:t>
+              <a:t>9/22/2017</a:t>
             </a:fld>
             <a:endParaRPr lang="en-US"/>
           </a:p>
@@ -1235,7 +1237,7 @@
           <a:p>
             <a:fld id="{096B5631-8577-E648-B608-389A859B729B}" type="datetimeFigureOut">
               <a:rPr lang="en-US" smtClean="0"/>
-              <a:t>9/6/2017</a:t>
+              <a:t>9/22/2017</a:t>
             </a:fld>
             <a:endParaRPr lang="en-US"/>
           </a:p>
@@ -1458,7 +1460,7 @@
           <a:p>
             <a:fld id="{096B5631-8577-E648-B608-389A859B729B}" type="datetimeFigureOut">
               <a:rPr lang="en-US" smtClean="0"/>
-              <a:t>9/6/2017</a:t>
+              <a:t>9/22/2017</a:t>
             </a:fld>
             <a:endParaRPr lang="en-US"/>
           </a:p>
@@ -1599,7 +1601,7 @@
           <a:p>
             <a:fld id="{096B5631-8577-E648-B608-389A859B729B}" type="datetimeFigureOut">
               <a:rPr lang="en-US" smtClean="0"/>
-              <a:t>9/6/2017</a:t>
+              <a:t>9/22/2017</a:t>
             </a:fld>
             <a:endParaRPr lang="en-US"/>
           </a:p>
@@ -1993,7 +1995,7 @@
           <a:p>
             <a:fld id="{096B5631-8577-E648-B608-389A859B729B}" type="datetimeFigureOut">
               <a:rPr lang="en-US" smtClean="0"/>
-              <a:t>9/6/2017</a:t>
+              <a:t>9/22/2017</a:t>
             </a:fld>
             <a:endParaRPr lang="en-US"/>
           </a:p>
@@ -2281,7 +2283,7 @@
           <a:p>
             <a:fld id="{096B5631-8577-E648-B608-389A859B729B}" type="datetimeFigureOut">
               <a:rPr lang="en-US" smtClean="0"/>
-              <a:t>9/6/2017</a:t>
+              <a:t>9/22/2017</a:t>
             </a:fld>
             <a:endParaRPr lang="en-US"/>
           </a:p>
@@ -2743,7 +2745,7 @@
           <a:p>
             <a:fld id="{096B5631-8577-E648-B608-389A859B729B}" type="datetimeFigureOut">
               <a:rPr lang="en-US" smtClean="0"/>
-              <a:t>9/6/2017</a:t>
+              <a:t>9/22/2017</a:t>
             </a:fld>
             <a:endParaRPr lang="en-US"/>
           </a:p>
@@ -2951,7 +2953,7 @@
           <a:p>
             <a:fld id="{096B5631-8577-E648-B608-389A859B729B}" type="datetimeFigureOut">
               <a:rPr lang="en-US" smtClean="0"/>
-              <a:t>9/6/2017</a:t>
+              <a:t>9/22/2017</a:t>
             </a:fld>
             <a:endParaRPr lang="en-US"/>
           </a:p>
@@ -3159,7 +3161,7 @@
           <a:p>
             <a:fld id="{096B5631-8577-E648-B608-389A859B729B}" type="datetimeFigureOut">
               <a:rPr lang="en-US" smtClean="0"/>
-              <a:t>9/6/2017</a:t>
+              <a:t>9/22/2017</a:t>
             </a:fld>
             <a:endParaRPr lang="en-US"/>
           </a:p>
@@ -3670,7 +3672,7 @@
           <a:p>
             <a:fld id="{096B5631-8577-E648-B608-389A859B729B}" type="datetimeFigureOut">
               <a:rPr lang="en-US" smtClean="0"/>
-              <a:t>9/6/2017</a:t>
+              <a:t>9/22/2017</a:t>
             </a:fld>
             <a:endParaRPr lang="en-US"/>
           </a:p>
@@ -3913,7 +3915,7 @@
             <a:fld id="{096B5631-8577-E648-B608-389A859B729B}" type="datetimeFigureOut">
               <a:rPr lang="en-US" smtClean="0"/>
               <a:pPr/>
-              <a:t>9/6/2017</a:t>
+              <a:t>9/22/2017</a:t>
             </a:fld>
             <a:endParaRPr lang="en-US" dirty="0"/>
           </a:p>
@@ -4866,7 +4868,29 @@
                 <a:ea typeface="DejaVu Sans Mono" panose="020B0609030804020204" pitchFamily="49" charset="0"/>
                 <a:cs typeface="DejaVu Sans Mono" panose="020B0609030804020204" pitchFamily="49" charset="0"/>
               </a:rPr>
-              <a:t>    // The “exports” keyword relates to package names</a:t>
+              <a:t>    // The “exports” keyword relates to </a:t>
+            </a:r>
+            <a:r>
+              <a:rPr lang="en-US" sz="2000" dirty="0" smtClean="0">
+                <a:solidFill>
+                  <a:srgbClr val="00B050"/>
+                </a:solidFill>
+                <a:latin typeface="DejaVu Sans Mono" panose="020B0609030804020204" pitchFamily="49" charset="0"/>
+                <a:ea typeface="DejaVu Sans Mono" panose="020B0609030804020204" pitchFamily="49" charset="0"/>
+                <a:cs typeface="DejaVu Sans Mono" panose="020B0609030804020204" pitchFamily="49" charset="0"/>
+              </a:rPr>
+              <a:t>internal package </a:t>
+            </a:r>
+            <a:r>
+              <a:rPr lang="en-US" sz="2000" dirty="0" smtClean="0">
+                <a:solidFill>
+                  <a:srgbClr val="00B050"/>
+                </a:solidFill>
+                <a:latin typeface="DejaVu Sans Mono" panose="020B0609030804020204" pitchFamily="49" charset="0"/>
+                <a:ea typeface="DejaVu Sans Mono" panose="020B0609030804020204" pitchFamily="49" charset="0"/>
+                <a:cs typeface="DejaVu Sans Mono" panose="020B0609030804020204" pitchFamily="49" charset="0"/>
+              </a:rPr>
+              <a:t>names</a:t>
             </a:r>
           </a:p>
           <a:p>
@@ -5087,19 +5111,28 @@
             </a:r>
           </a:p>
           <a:p>
-            <a:pPr lvl="1"/>
+            <a:pPr lvl="2"/>
             <a:r>
               <a:rPr lang="en-US" dirty="0" smtClean="0"/>
               <a:t>[“</a:t>
             </a:r>
             <a:r>
               <a:rPr lang="en-US" dirty="0"/>
-              <a:t>requires public” grants readability to modules that depend on this </a:t>
-            </a:r>
-            <a:r>
-              <a:rPr lang="en-US" dirty="0" smtClean="0"/>
-              <a:t>one – deprecated keyword]</a:t>
-            </a:r>
+              <a:t>requires public” </a:t>
+            </a:r>
+            <a:r>
+              <a:rPr lang="en-US" dirty="0" smtClean="0"/>
+              <a:t>is a </a:t>
+            </a:r>
+            <a:r>
+              <a:rPr lang="en-US" dirty="0" smtClean="0"/>
+              <a:t>deprecated </a:t>
+            </a:r>
+            <a:r>
+              <a:rPr lang="en-US" dirty="0" smtClean="0"/>
+              <a:t>keyword, replaced by “requires transitive”]</a:t>
+            </a:r>
+            <a:endParaRPr lang="en-US" dirty="0" smtClean="0"/>
           </a:p>
           <a:p>
             <a:pPr lvl="1"/>
@@ -5128,11 +5161,7 @@
             <a:pPr lvl="1"/>
             <a:r>
               <a:rPr lang="en-US" dirty="0" smtClean="0"/>
-              <a:t>Uniqueness </a:t>
-            </a:r>
-            <a:r>
-              <a:rPr lang="en-US" dirty="0" smtClean="0"/>
-              <a:t>– two modules may not contain the same package</a:t>
+              <a:t>Uniqueness – two modules may not contain the same package</a:t>
             </a:r>
           </a:p>
           <a:p>
@@ -5154,11 +5183,7 @@
             </a:r>
             <a:r>
               <a:rPr lang="en-US" dirty="0" smtClean="0"/>
-              <a:t>” module </a:t>
-            </a:r>
-            <a:r>
-              <a:rPr lang="en-US" dirty="0" smtClean="0"/>
-              <a:t>– JAR files on the class-path will continue to function as usual</a:t>
+              <a:t>” module – JAR files on the class-path will continue to function as usual</a:t>
             </a:r>
           </a:p>
           <a:p>
@@ -5173,11 +5198,7 @@
             </a:r>
             <a:r>
               <a:rPr lang="en-US" dirty="0" smtClean="0"/>
-              <a:t>” module – </a:t>
-            </a:r>
-            <a:r>
-              <a:rPr lang="en-US" dirty="0" smtClean="0"/>
-              <a:t>Non-modularized JAR files can be placed on the module-path</a:t>
+              <a:t>” module – Non-modularized JAR files can be placed on the module-path</a:t>
             </a:r>
             <a:endParaRPr lang="en-US" dirty="0"/>
           </a:p>
@@ -5859,22 +5880,42 @@
           <a:p>
             <a:r>
               <a:rPr lang="en-US" dirty="0" smtClean="0"/>
-              <a:t>Use “--module-path” [or </a:t>
-            </a:r>
-            <a:r>
-              <a:rPr lang="en-US" dirty="0" smtClean="0"/>
-              <a:t>“-p</a:t>
-            </a:r>
-            <a:r>
-              <a:rPr lang="en-US" dirty="0" smtClean="0"/>
-              <a:t>”] to define module path</a:t>
+              <a:t>Use “--module-path” [or “-p”] to define module path</a:t>
             </a:r>
           </a:p>
           <a:p>
             <a:pPr lvl="1"/>
             <a:r>
-              <a:rPr lang="en-US" dirty="0" smtClean="0"/>
-              <a:t>Any JAR file can appear here, modularized </a:t>
+              <a:rPr lang="en-US" dirty="0"/>
+              <a:t>A </a:t>
+            </a:r>
+            <a:r>
+              <a:rPr lang="en-US" dirty="0" smtClean="0"/>
+              <a:t>“</a:t>
+            </a:r>
+            <a:r>
+              <a:rPr lang="en-US" dirty="0" err="1" smtClean="0"/>
+              <a:t>xxxx.jmod</a:t>
+            </a:r>
+            <a:r>
+              <a:rPr lang="en-US" dirty="0"/>
+              <a:t>” module must go on the module </a:t>
+            </a:r>
+            <a:r>
+              <a:rPr lang="en-US" dirty="0" smtClean="0"/>
+              <a:t>path</a:t>
+            </a:r>
+            <a:endParaRPr lang="en-US" dirty="0" smtClean="0"/>
+          </a:p>
+          <a:p>
+            <a:pPr lvl="1"/>
+            <a:r>
+              <a:rPr lang="en-US" dirty="0" smtClean="0"/>
+              <a:t>Any </a:t>
+            </a:r>
+            <a:r>
+              <a:rPr lang="en-US" dirty="0" smtClean="0"/>
+              <a:t>JAR file can appear here, modularized </a:t>
             </a:r>
             <a:r>
               <a:rPr lang="en-US" dirty="0"/>
@@ -5885,15 +5926,35 @@
             <a:pPr lvl="2"/>
             <a:r>
               <a:rPr lang="en-US" dirty="0" smtClean="0"/>
-              <a:t>Any non-modularized JAR file will be considered part of the “automatic” module, with all public classes </a:t>
-            </a:r>
-            <a:r>
-              <a:rPr lang="en-US" dirty="0" smtClean="0"/>
-              <a:t>exposed -- t</a:t>
-            </a:r>
-            <a:r>
-              <a:rPr lang="en-US" dirty="0" smtClean="0"/>
-              <a:t>he system will generate a module name based on the JAR file name</a:t>
+              <a:t>A </a:t>
+            </a:r>
+            <a:r>
+              <a:rPr lang="en-US" dirty="0" smtClean="0"/>
+              <a:t>non-modularized JAR file will be </a:t>
+            </a:r>
+            <a:r>
+              <a:rPr lang="en-US" dirty="0" smtClean="0"/>
+              <a:t>part </a:t>
+            </a:r>
+            <a:r>
+              <a:rPr lang="en-US" dirty="0" smtClean="0"/>
+              <a:t>of the “automatic” </a:t>
+            </a:r>
+            <a:r>
+              <a:rPr lang="en-US" dirty="0" smtClean="0"/>
+              <a:t>module: all </a:t>
+            </a:r>
+            <a:r>
+              <a:rPr lang="en-US" dirty="0" smtClean="0"/>
+              <a:t>public classes </a:t>
+            </a:r>
+            <a:r>
+              <a:rPr lang="en-US" dirty="0" smtClean="0"/>
+              <a:t>are exposed, and it will be given a module </a:t>
+            </a:r>
+            <a:r>
+              <a:rPr lang="en-US" dirty="0" smtClean="0"/>
+              <a:t>name based on the JAR file name</a:t>
             </a:r>
           </a:p>
           <a:p>
@@ -5922,43 +5983,22 @@
               <a:rPr lang="en-US" dirty="0" smtClean="0"/>
               <a:t>path</a:t>
             </a:r>
-            <a:endParaRPr lang="en-US" dirty="0" smtClean="0"/>
           </a:p>
           <a:p>
             <a:pPr lvl="1"/>
             <a:r>
               <a:rPr lang="en-US" dirty="0" smtClean="0"/>
-              <a:t>No </a:t>
-            </a:r>
-            <a:r>
-              <a:rPr lang="en-US" dirty="0" smtClean="0"/>
-              <a:t>two modules can contain the same </a:t>
-            </a:r>
-            <a:r>
-              <a:rPr lang="en-US" dirty="0" smtClean="0"/>
-              <a:t>package</a:t>
-            </a:r>
-          </a:p>
-          <a:p>
-            <a:pPr lvl="1"/>
-            <a:r>
-              <a:rPr lang="en-US" dirty="0" smtClean="0"/>
-              <a:t>A “.</a:t>
-            </a:r>
-            <a:r>
-              <a:rPr lang="en-US" dirty="0" err="1" smtClean="0"/>
-              <a:t>jmod</a:t>
-            </a:r>
-            <a:r>
-              <a:rPr lang="en-US" dirty="0" smtClean="0"/>
-              <a:t>” module must go on the module path</a:t>
-            </a:r>
-            <a:endParaRPr lang="en-US" dirty="0" smtClean="0"/>
-          </a:p>
-          <a:p>
+              <a:t>No two modules can contain the same package</a:t>
+            </a:r>
+          </a:p>
+          <a:p>
+            <a:r>
+              <a:rPr lang="en-US" dirty="0" smtClean="0"/>
+              <a:t>Use </a:t>
+            </a:r>
             <a:r>
               <a:rPr lang="en-US" dirty="0"/>
-              <a:t>Use “-</a:t>
+              <a:t>“-</a:t>
             </a:r>
             <a:r>
               <a:rPr lang="en-US" dirty="0" err="1"/>
@@ -6413,15 +6453,7 @@
           <a:p>
             <a:r>
               <a:rPr lang="en-US" dirty="0" smtClean="0"/>
-              <a:t>But Wait … won’t </a:t>
-            </a:r>
-            <a:r>
-              <a:rPr lang="en-US" dirty="0" smtClean="0"/>
-              <a:t>Java9 </a:t>
-            </a:r>
-            <a:r>
-              <a:rPr lang="en-US" dirty="0" smtClean="0"/>
-              <a:t>break some tools?</a:t>
+              <a:t>But Wait … won’t Java9 break some tools?</a:t>
             </a:r>
             <a:endParaRPr lang="en-US" dirty="0"/>
           </a:p>
@@ -6460,15 +6492,7 @@
           <a:p>
             <a:r>
               <a:rPr lang="en-US" dirty="0" smtClean="0"/>
-              <a:t>Work-around is via the </a:t>
-            </a:r>
-            <a:r>
-              <a:rPr lang="en-US" dirty="0" smtClean="0"/>
-              <a:t>“illegal-access</a:t>
-            </a:r>
-            <a:r>
-              <a:rPr lang="en-US" dirty="0" smtClean="0"/>
-              <a:t>” flag:</a:t>
+              <a:t>Work-around is via the “illegal-access” flag:</a:t>
             </a:r>
           </a:p>
           <a:p>
@@ -7092,14 +7116,6 @@
               </a:rPr>
               <a:t>stand-alone   \</a:t>
             </a:r>
-            <a:r>
-              <a:rPr lang="en-US" sz="2400" dirty="0" smtClean="0">
-                <a:latin typeface="DejaVu Sans Mono" panose="020B0609030804020204" pitchFamily="49" charset="0"/>
-                <a:ea typeface="DejaVu Sans Mono" panose="020B0609030804020204" pitchFamily="49" charset="0"/>
-                <a:cs typeface="DejaVu Sans Mono" panose="020B0609030804020204" pitchFamily="49" charset="0"/>
-              </a:rPr>
-              <a:t/>
-            </a:r>
             <a:br>
               <a:rPr lang="en-US" sz="2400" dirty="0" smtClean="0">
                 <a:latin typeface="DejaVu Sans Mono" panose="020B0609030804020204" pitchFamily="49" charset="0"/>
@@ -7131,14 +7147,6 @@
               </a:rPr>
               <a:t>&lt;application-module-name&gt;      \</a:t>
             </a:r>
-            <a:r>
-              <a:rPr lang="en-US" sz="2400" dirty="0" smtClean="0">
-                <a:latin typeface="DejaVu Sans Mono" panose="020B0609030804020204" pitchFamily="49" charset="0"/>
-                <a:ea typeface="DejaVu Sans Mono" panose="020B0609030804020204" pitchFamily="49" charset="0"/>
-                <a:cs typeface="DejaVu Sans Mono" panose="020B0609030804020204" pitchFamily="49" charset="0"/>
-              </a:rPr>
-              <a:t/>
-            </a:r>
             <a:br>
               <a:rPr lang="en-US" sz="2400" dirty="0" smtClean="0">
                 <a:latin typeface="DejaVu Sans Mono" panose="020B0609030804020204" pitchFamily="49" charset="0"/>
@@ -7178,14 +7186,6 @@
               </a:rPr>
               <a:t>“     \</a:t>
             </a:r>
-            <a:r>
-              <a:rPr lang="en-US" sz="2400" dirty="0" smtClean="0">
-                <a:latin typeface="DejaVu Sans Mono" panose="020B0609030804020204" pitchFamily="49" charset="0"/>
-                <a:ea typeface="DejaVu Sans Mono" panose="020B0609030804020204" pitchFamily="49" charset="0"/>
-                <a:cs typeface="DejaVu Sans Mono" panose="020B0609030804020204" pitchFamily="49" charset="0"/>
-              </a:rPr>
-              <a:t/>
-            </a:r>
             <a:br>
               <a:rPr lang="en-US" sz="2400" dirty="0" smtClean="0">
                 <a:latin typeface="DejaVu Sans Mono" panose="020B0609030804020204" pitchFamily="49" charset="0"/>
@@ -7217,14 +7217,6 @@
               </a:rPr>
               <a:t>launcher                                   \</a:t>
             </a:r>
-            <a:r>
-              <a:rPr lang="en-US" sz="2400" dirty="0" smtClean="0">
-                <a:latin typeface="DejaVu Sans Mono" panose="020B0609030804020204" pitchFamily="49" charset="0"/>
-                <a:ea typeface="DejaVu Sans Mono" panose="020B0609030804020204" pitchFamily="49" charset="0"/>
-                <a:cs typeface="DejaVu Sans Mono" panose="020B0609030804020204" pitchFamily="49" charset="0"/>
-              </a:rPr>
-              <a:t/>
-            </a:r>
             <a:br>
               <a:rPr lang="en-US" sz="2400" dirty="0" smtClean="0">
                 <a:latin typeface="DejaVu Sans Mono" panose="020B0609030804020204" pitchFamily="49" charset="0"/>
@@ -7241,13 +7233,26 @@
               <a:t>     </a:t>
             </a:r>
             <a:r>
-              <a:rPr lang="en-US" sz="2400" dirty="0">
+              <a:rPr lang="en-US" sz="2400" dirty="0" smtClean="0">
                 <a:latin typeface="DejaVu Sans Mono" panose="020B0609030804020204" pitchFamily="49" charset="0"/>
                 <a:ea typeface="DejaVu Sans Mono" panose="020B0609030804020204" pitchFamily="49" charset="0"/>
                 <a:cs typeface="DejaVu Sans Mono" panose="020B0609030804020204" pitchFamily="49" charset="0"/>
               </a:rPr>
-              <a:t>start-app=sort2017.java9/sort2017.java9.DumpSchema</a:t>
-            </a:r>
+              <a:t>start-app</a:t>
+            </a:r>
+            <a:r>
+              <a:rPr lang="en-US" sz="2400" dirty="0" smtClean="0">
+                <a:latin typeface="DejaVu Sans Mono" panose="020B0609030804020204" pitchFamily="49" charset="0"/>
+                <a:ea typeface="DejaVu Sans Mono" panose="020B0609030804020204" pitchFamily="49" charset="0"/>
+                <a:cs typeface="DejaVu Sans Mono" panose="020B0609030804020204" pitchFamily="49" charset="0"/>
+              </a:rPr>
+              <a:t>=&lt;module-name&gt;/&lt;class-name&gt;</a:t>
+            </a:r>
+            <a:endParaRPr lang="en-US" sz="2400" dirty="0">
+              <a:latin typeface="DejaVu Sans Mono" panose="020B0609030804020204" pitchFamily="49" charset="0"/>
+              <a:ea typeface="DejaVu Sans Mono" panose="020B0609030804020204" pitchFamily="49" charset="0"/>
+              <a:cs typeface="DejaVu Sans Mono" panose="020B0609030804020204" pitchFamily="49" charset="0"/>
+            </a:endParaRPr>
           </a:p>
           <a:p>
             <a:pPr marL="0" indent="0">
@@ -7314,6 +7319,463 @@
           <a:p>
             <a:r>
               <a:rPr lang="en-US" dirty="0" smtClean="0"/>
+              <a:t>Multi-Release JAR File (MRJAR)</a:t>
+            </a:r>
+            <a:endParaRPr lang="en-US" dirty="0"/>
+          </a:p>
+        </p:txBody>
+      </p:sp>
+      <p:sp>
+        <p:nvSpPr>
+          <p:cNvPr id="3" name="Content Placeholder 2"/>
+          <p:cNvSpPr>
+            <a:spLocks noGrp="1"/>
+          </p:cNvSpPr>
+          <p:nvPr>
+            <p:ph sz="quarter" idx="13"/>
+          </p:nvPr>
+        </p:nvSpPr>
+        <p:spPr/>
+        <p:txBody>
+          <a:bodyPr>
+            <a:noAutofit/>
+          </a:bodyPr>
+          <a:lstStyle/>
+          <a:p>
+            <a:pPr marL="0" indent="0">
+              <a:lnSpc>
+                <a:spcPct val="100000"/>
+              </a:lnSpc>
+              <a:spcBef>
+                <a:spcPts val="600"/>
+              </a:spcBef>
+              <a:buNone/>
+            </a:pPr>
+            <a:r>
+              <a:rPr lang="en-US" sz="1600" dirty="0" smtClean="0">
+                <a:latin typeface="DejaVu Sans Mono" panose="020B0609030804020204" pitchFamily="49" charset="0"/>
+                <a:ea typeface="DejaVu Sans Mono" panose="020B0609030804020204" pitchFamily="49" charset="0"/>
+                <a:cs typeface="DejaVu Sans Mono" panose="020B0609030804020204" pitchFamily="49" charset="0"/>
+              </a:rPr>
+              <a:t>[JAR root]</a:t>
+            </a:r>
+            <a:endParaRPr lang="en-US" sz="1600" dirty="0">
+              <a:latin typeface="DejaVu Sans Mono" panose="020B0609030804020204" pitchFamily="49" charset="0"/>
+              <a:ea typeface="DejaVu Sans Mono" panose="020B0609030804020204" pitchFamily="49" charset="0"/>
+              <a:cs typeface="DejaVu Sans Mono" panose="020B0609030804020204" pitchFamily="49" charset="0"/>
+            </a:endParaRPr>
+          </a:p>
+          <a:p>
+            <a:pPr marL="0" indent="0">
+              <a:lnSpc>
+                <a:spcPct val="100000"/>
+              </a:lnSpc>
+              <a:spcBef>
+                <a:spcPts val="600"/>
+              </a:spcBef>
+              <a:buNone/>
+            </a:pPr>
+            <a:r>
+              <a:rPr lang="en-US" sz="1600" dirty="0">
+                <a:latin typeface="DejaVu Sans Mono" panose="020B0609030804020204" pitchFamily="49" charset="0"/>
+                <a:ea typeface="DejaVu Sans Mono" panose="020B0609030804020204" pitchFamily="49" charset="0"/>
+                <a:cs typeface="DejaVu Sans Mono" panose="020B0609030804020204" pitchFamily="49" charset="0"/>
+              </a:rPr>
+              <a:t>  </a:t>
+            </a:r>
+            <a:r>
+              <a:rPr lang="en-US" sz="1600" dirty="0" err="1">
+                <a:latin typeface="DejaVu Sans Mono" panose="020B0609030804020204" pitchFamily="49" charset="0"/>
+                <a:ea typeface="DejaVu Sans Mono" panose="020B0609030804020204" pitchFamily="49" charset="0"/>
+                <a:cs typeface="DejaVu Sans Mono" panose="020B0609030804020204" pitchFamily="49" charset="0"/>
+              </a:rPr>
+              <a:t>A.class</a:t>
+            </a:r>
+            <a:endParaRPr lang="en-US" sz="1600" dirty="0">
+              <a:latin typeface="DejaVu Sans Mono" panose="020B0609030804020204" pitchFamily="49" charset="0"/>
+              <a:ea typeface="DejaVu Sans Mono" panose="020B0609030804020204" pitchFamily="49" charset="0"/>
+              <a:cs typeface="DejaVu Sans Mono" panose="020B0609030804020204" pitchFamily="49" charset="0"/>
+            </a:endParaRPr>
+          </a:p>
+          <a:p>
+            <a:pPr marL="0" indent="0">
+              <a:lnSpc>
+                <a:spcPct val="100000"/>
+              </a:lnSpc>
+              <a:spcBef>
+                <a:spcPts val="600"/>
+              </a:spcBef>
+              <a:buNone/>
+            </a:pPr>
+            <a:r>
+              <a:rPr lang="en-US" sz="1600" dirty="0">
+                <a:latin typeface="DejaVu Sans Mono" panose="020B0609030804020204" pitchFamily="49" charset="0"/>
+                <a:ea typeface="DejaVu Sans Mono" panose="020B0609030804020204" pitchFamily="49" charset="0"/>
+                <a:cs typeface="DejaVu Sans Mono" panose="020B0609030804020204" pitchFamily="49" charset="0"/>
+              </a:rPr>
+              <a:t>  </a:t>
+            </a:r>
+            <a:r>
+              <a:rPr lang="en-US" sz="1600" dirty="0" err="1">
+                <a:latin typeface="DejaVu Sans Mono" panose="020B0609030804020204" pitchFamily="49" charset="0"/>
+                <a:ea typeface="DejaVu Sans Mono" panose="020B0609030804020204" pitchFamily="49" charset="0"/>
+                <a:cs typeface="DejaVu Sans Mono" panose="020B0609030804020204" pitchFamily="49" charset="0"/>
+              </a:rPr>
+              <a:t>B.class</a:t>
+            </a:r>
+            <a:endParaRPr lang="en-US" sz="1600" dirty="0">
+              <a:latin typeface="DejaVu Sans Mono" panose="020B0609030804020204" pitchFamily="49" charset="0"/>
+              <a:ea typeface="DejaVu Sans Mono" panose="020B0609030804020204" pitchFamily="49" charset="0"/>
+              <a:cs typeface="DejaVu Sans Mono" panose="020B0609030804020204" pitchFamily="49" charset="0"/>
+            </a:endParaRPr>
+          </a:p>
+          <a:p>
+            <a:pPr marL="0" indent="0">
+              <a:lnSpc>
+                <a:spcPct val="100000"/>
+              </a:lnSpc>
+              <a:spcBef>
+                <a:spcPts val="600"/>
+              </a:spcBef>
+              <a:buNone/>
+            </a:pPr>
+            <a:r>
+              <a:rPr lang="en-US" sz="1600" dirty="0">
+                <a:latin typeface="DejaVu Sans Mono" panose="020B0609030804020204" pitchFamily="49" charset="0"/>
+                <a:ea typeface="DejaVu Sans Mono" panose="020B0609030804020204" pitchFamily="49" charset="0"/>
+                <a:cs typeface="DejaVu Sans Mono" panose="020B0609030804020204" pitchFamily="49" charset="0"/>
+              </a:rPr>
+              <a:t>  </a:t>
+            </a:r>
+            <a:r>
+              <a:rPr lang="en-US" sz="1600" dirty="0" err="1">
+                <a:latin typeface="DejaVu Sans Mono" panose="020B0609030804020204" pitchFamily="49" charset="0"/>
+                <a:ea typeface="DejaVu Sans Mono" panose="020B0609030804020204" pitchFamily="49" charset="0"/>
+                <a:cs typeface="DejaVu Sans Mono" panose="020B0609030804020204" pitchFamily="49" charset="0"/>
+              </a:rPr>
+              <a:t>C.class</a:t>
+            </a:r>
+            <a:endParaRPr lang="en-US" sz="1600" dirty="0">
+              <a:latin typeface="DejaVu Sans Mono" panose="020B0609030804020204" pitchFamily="49" charset="0"/>
+              <a:ea typeface="DejaVu Sans Mono" panose="020B0609030804020204" pitchFamily="49" charset="0"/>
+              <a:cs typeface="DejaVu Sans Mono" panose="020B0609030804020204" pitchFamily="49" charset="0"/>
+            </a:endParaRPr>
+          </a:p>
+          <a:p>
+            <a:pPr marL="0" indent="0">
+              <a:lnSpc>
+                <a:spcPct val="100000"/>
+              </a:lnSpc>
+              <a:spcBef>
+                <a:spcPts val="600"/>
+              </a:spcBef>
+              <a:buNone/>
+            </a:pPr>
+            <a:r>
+              <a:rPr lang="en-US" sz="1600" dirty="0">
+                <a:latin typeface="DejaVu Sans Mono" panose="020B0609030804020204" pitchFamily="49" charset="0"/>
+                <a:ea typeface="DejaVu Sans Mono" panose="020B0609030804020204" pitchFamily="49" charset="0"/>
+                <a:cs typeface="DejaVu Sans Mono" panose="020B0609030804020204" pitchFamily="49" charset="0"/>
+              </a:rPr>
+              <a:t>  </a:t>
+            </a:r>
+            <a:r>
+              <a:rPr lang="en-US" sz="1600" dirty="0" err="1">
+                <a:latin typeface="DejaVu Sans Mono" panose="020B0609030804020204" pitchFamily="49" charset="0"/>
+                <a:ea typeface="DejaVu Sans Mono" panose="020B0609030804020204" pitchFamily="49" charset="0"/>
+                <a:cs typeface="DejaVu Sans Mono" panose="020B0609030804020204" pitchFamily="49" charset="0"/>
+              </a:rPr>
+              <a:t>D.class</a:t>
+            </a:r>
+            <a:endParaRPr lang="en-US" sz="1600" dirty="0">
+              <a:latin typeface="DejaVu Sans Mono" panose="020B0609030804020204" pitchFamily="49" charset="0"/>
+              <a:ea typeface="DejaVu Sans Mono" panose="020B0609030804020204" pitchFamily="49" charset="0"/>
+              <a:cs typeface="DejaVu Sans Mono" panose="020B0609030804020204" pitchFamily="49" charset="0"/>
+            </a:endParaRPr>
+          </a:p>
+          <a:p>
+            <a:pPr marL="0" indent="0">
+              <a:lnSpc>
+                <a:spcPct val="100000"/>
+              </a:lnSpc>
+              <a:spcBef>
+                <a:spcPts val="600"/>
+              </a:spcBef>
+              <a:buNone/>
+            </a:pPr>
+            <a:r>
+              <a:rPr lang="en-US" sz="1600" dirty="0">
+                <a:latin typeface="DejaVu Sans Mono" panose="020B0609030804020204" pitchFamily="49" charset="0"/>
+                <a:ea typeface="DejaVu Sans Mono" panose="020B0609030804020204" pitchFamily="49" charset="0"/>
+                <a:cs typeface="DejaVu Sans Mono" panose="020B0609030804020204" pitchFamily="49" charset="0"/>
+              </a:rPr>
+              <a:t>  META-INF</a:t>
+            </a:r>
+          </a:p>
+          <a:p>
+            <a:pPr marL="0" indent="0">
+              <a:lnSpc>
+                <a:spcPct val="100000"/>
+              </a:lnSpc>
+              <a:spcBef>
+                <a:spcPts val="600"/>
+              </a:spcBef>
+              <a:buNone/>
+            </a:pPr>
+            <a:r>
+              <a:rPr lang="en-US" sz="1600" dirty="0">
+                <a:latin typeface="DejaVu Sans Mono" panose="020B0609030804020204" pitchFamily="49" charset="0"/>
+                <a:ea typeface="DejaVu Sans Mono" panose="020B0609030804020204" pitchFamily="49" charset="0"/>
+                <a:cs typeface="DejaVu Sans Mono" panose="020B0609030804020204" pitchFamily="49" charset="0"/>
+              </a:rPr>
+              <a:t>     MANIFEST.MF</a:t>
+            </a:r>
+          </a:p>
+          <a:p>
+            <a:pPr marL="0" indent="0">
+              <a:lnSpc>
+                <a:spcPct val="100000"/>
+              </a:lnSpc>
+              <a:spcBef>
+                <a:spcPts val="600"/>
+              </a:spcBef>
+              <a:buNone/>
+            </a:pPr>
+            <a:r>
+              <a:rPr lang="en-US" sz="1600" dirty="0">
+                <a:solidFill>
+                  <a:srgbClr val="FF0000"/>
+                </a:solidFill>
+                <a:latin typeface="DejaVu Sans Mono" panose="020B0609030804020204" pitchFamily="49" charset="0"/>
+                <a:ea typeface="DejaVu Sans Mono" panose="020B0609030804020204" pitchFamily="49" charset="0"/>
+                <a:cs typeface="DejaVu Sans Mono" panose="020B0609030804020204" pitchFamily="49" charset="0"/>
+              </a:rPr>
+              <a:t>     versions</a:t>
+            </a:r>
+          </a:p>
+          <a:p>
+            <a:pPr marL="0" indent="0">
+              <a:lnSpc>
+                <a:spcPct val="100000"/>
+              </a:lnSpc>
+              <a:spcBef>
+                <a:spcPts val="600"/>
+              </a:spcBef>
+              <a:buNone/>
+            </a:pPr>
+            <a:r>
+              <a:rPr lang="en-US" sz="1600" dirty="0">
+                <a:solidFill>
+                  <a:srgbClr val="FF0000"/>
+                </a:solidFill>
+                <a:latin typeface="DejaVu Sans Mono" panose="020B0609030804020204" pitchFamily="49" charset="0"/>
+                <a:ea typeface="DejaVu Sans Mono" panose="020B0609030804020204" pitchFamily="49" charset="0"/>
+                <a:cs typeface="DejaVu Sans Mono" panose="020B0609030804020204" pitchFamily="49" charset="0"/>
+              </a:rPr>
+              <a:t>        9</a:t>
+            </a:r>
+          </a:p>
+          <a:p>
+            <a:pPr marL="0" indent="0">
+              <a:lnSpc>
+                <a:spcPct val="100000"/>
+              </a:lnSpc>
+              <a:spcBef>
+                <a:spcPts val="600"/>
+              </a:spcBef>
+              <a:buNone/>
+            </a:pPr>
+            <a:r>
+              <a:rPr lang="en-US" sz="1600" dirty="0">
+                <a:solidFill>
+                  <a:srgbClr val="FF0000"/>
+                </a:solidFill>
+                <a:latin typeface="DejaVu Sans Mono" panose="020B0609030804020204" pitchFamily="49" charset="0"/>
+                <a:ea typeface="DejaVu Sans Mono" panose="020B0609030804020204" pitchFamily="49" charset="0"/>
+                <a:cs typeface="DejaVu Sans Mono" panose="020B0609030804020204" pitchFamily="49" charset="0"/>
+              </a:rPr>
+              <a:t>           </a:t>
+            </a:r>
+            <a:r>
+              <a:rPr lang="en-US" sz="1600" dirty="0" err="1">
+                <a:solidFill>
+                  <a:srgbClr val="FF0000"/>
+                </a:solidFill>
+                <a:latin typeface="DejaVu Sans Mono" panose="020B0609030804020204" pitchFamily="49" charset="0"/>
+                <a:ea typeface="DejaVu Sans Mono" panose="020B0609030804020204" pitchFamily="49" charset="0"/>
+                <a:cs typeface="DejaVu Sans Mono" panose="020B0609030804020204" pitchFamily="49" charset="0"/>
+              </a:rPr>
+              <a:t>A.class</a:t>
+            </a:r>
+            <a:endParaRPr lang="en-US" sz="1600" dirty="0">
+              <a:solidFill>
+                <a:srgbClr val="FF0000"/>
+              </a:solidFill>
+              <a:latin typeface="DejaVu Sans Mono" panose="020B0609030804020204" pitchFamily="49" charset="0"/>
+              <a:ea typeface="DejaVu Sans Mono" panose="020B0609030804020204" pitchFamily="49" charset="0"/>
+              <a:cs typeface="DejaVu Sans Mono" panose="020B0609030804020204" pitchFamily="49" charset="0"/>
+            </a:endParaRPr>
+          </a:p>
+          <a:p>
+            <a:pPr marL="0" indent="0">
+              <a:lnSpc>
+                <a:spcPct val="100000"/>
+              </a:lnSpc>
+              <a:spcBef>
+                <a:spcPts val="600"/>
+              </a:spcBef>
+              <a:buNone/>
+            </a:pPr>
+            <a:r>
+              <a:rPr lang="en-US" sz="1600" dirty="0">
+                <a:solidFill>
+                  <a:srgbClr val="FF0000"/>
+                </a:solidFill>
+                <a:latin typeface="DejaVu Sans Mono" panose="020B0609030804020204" pitchFamily="49" charset="0"/>
+                <a:ea typeface="DejaVu Sans Mono" panose="020B0609030804020204" pitchFamily="49" charset="0"/>
+                <a:cs typeface="DejaVu Sans Mono" panose="020B0609030804020204" pitchFamily="49" charset="0"/>
+              </a:rPr>
+              <a:t>           </a:t>
+            </a:r>
+            <a:r>
+              <a:rPr lang="en-US" sz="1600" dirty="0" err="1">
+                <a:solidFill>
+                  <a:srgbClr val="FF0000"/>
+                </a:solidFill>
+                <a:latin typeface="DejaVu Sans Mono" panose="020B0609030804020204" pitchFamily="49" charset="0"/>
+                <a:ea typeface="DejaVu Sans Mono" panose="020B0609030804020204" pitchFamily="49" charset="0"/>
+                <a:cs typeface="DejaVu Sans Mono" panose="020B0609030804020204" pitchFamily="49" charset="0"/>
+              </a:rPr>
+              <a:t>B.class</a:t>
+            </a:r>
+            <a:endParaRPr lang="en-US" sz="1600" dirty="0">
+              <a:solidFill>
+                <a:srgbClr val="FF0000"/>
+              </a:solidFill>
+              <a:latin typeface="DejaVu Sans Mono" panose="020B0609030804020204" pitchFamily="49" charset="0"/>
+              <a:ea typeface="DejaVu Sans Mono" panose="020B0609030804020204" pitchFamily="49" charset="0"/>
+              <a:cs typeface="DejaVu Sans Mono" panose="020B0609030804020204" pitchFamily="49" charset="0"/>
+            </a:endParaRPr>
+          </a:p>
+          <a:p>
+            <a:pPr marL="0" indent="0">
+              <a:lnSpc>
+                <a:spcPct val="100000"/>
+              </a:lnSpc>
+              <a:spcBef>
+                <a:spcPts val="600"/>
+              </a:spcBef>
+              <a:buNone/>
+            </a:pPr>
+            <a:r>
+              <a:rPr lang="en-US" sz="1600" dirty="0">
+                <a:solidFill>
+                  <a:srgbClr val="FF0000"/>
+                </a:solidFill>
+                <a:latin typeface="DejaVu Sans Mono" panose="020B0609030804020204" pitchFamily="49" charset="0"/>
+                <a:ea typeface="DejaVu Sans Mono" panose="020B0609030804020204" pitchFamily="49" charset="0"/>
+                <a:cs typeface="DejaVu Sans Mono" panose="020B0609030804020204" pitchFamily="49" charset="0"/>
+              </a:rPr>
+              <a:t>        10</a:t>
+            </a:r>
+          </a:p>
+          <a:p>
+            <a:pPr marL="0" indent="0">
+              <a:lnSpc>
+                <a:spcPct val="100000"/>
+              </a:lnSpc>
+              <a:spcBef>
+                <a:spcPts val="600"/>
+              </a:spcBef>
+              <a:buNone/>
+            </a:pPr>
+            <a:r>
+              <a:rPr lang="en-US" sz="1600" dirty="0">
+                <a:solidFill>
+                  <a:srgbClr val="FF0000"/>
+                </a:solidFill>
+                <a:latin typeface="DejaVu Sans Mono" panose="020B0609030804020204" pitchFamily="49" charset="0"/>
+                <a:ea typeface="DejaVu Sans Mono" panose="020B0609030804020204" pitchFamily="49" charset="0"/>
+                <a:cs typeface="DejaVu Sans Mono" panose="020B0609030804020204" pitchFamily="49" charset="0"/>
+              </a:rPr>
+              <a:t>           </a:t>
+            </a:r>
+            <a:r>
+              <a:rPr lang="en-US" sz="1600" dirty="0" err="1">
+                <a:solidFill>
+                  <a:srgbClr val="FF0000"/>
+                </a:solidFill>
+                <a:latin typeface="DejaVu Sans Mono" panose="020B0609030804020204" pitchFamily="49" charset="0"/>
+                <a:ea typeface="DejaVu Sans Mono" panose="020B0609030804020204" pitchFamily="49" charset="0"/>
+                <a:cs typeface="DejaVu Sans Mono" panose="020B0609030804020204" pitchFamily="49" charset="0"/>
+              </a:rPr>
+              <a:t>A.class</a:t>
+            </a:r>
+            <a:endParaRPr lang="en-US" sz="1600" dirty="0">
+              <a:solidFill>
+                <a:srgbClr val="FF0000"/>
+              </a:solidFill>
+              <a:latin typeface="DejaVu Sans Mono" panose="020B0609030804020204" pitchFamily="49" charset="0"/>
+              <a:ea typeface="DejaVu Sans Mono" panose="020B0609030804020204" pitchFamily="49" charset="0"/>
+              <a:cs typeface="DejaVu Sans Mono" panose="020B0609030804020204" pitchFamily="49" charset="0"/>
+            </a:endParaRPr>
+          </a:p>
+        </p:txBody>
+      </p:sp>
+    </p:spTree>
+    <p:extLst>
+      <p:ext uri="{BB962C8B-B14F-4D97-AF65-F5344CB8AC3E}">
+        <p14:creationId xmlns:p14="http://schemas.microsoft.com/office/powerpoint/2010/main" val="707360430"/>
+      </p:ext>
+    </p:extLst>
+  </p:cSld>
+  <p:clrMapOvr>
+    <a:masterClrMapping/>
+  </p:clrMapOvr>
+  <p:timing>
+    <p:tnLst>
+      <p:par>
+        <p:cTn id="1" dur="indefinite" restart="never" nodeType="tmRoot"/>
+      </p:par>
+    </p:tnLst>
+  </p:timing>
+</p:sld>
+</file>
+
+<file path=ppt/slides/slide18.xml><?xml version="1.0" encoding="utf-8"?>
+<p:sld xmlns:a="http://schemas.openxmlformats.org/drawingml/2006/main" xmlns:r="http://schemas.openxmlformats.org/officeDocument/2006/relationships" xmlns:p="http://schemas.openxmlformats.org/presentationml/2006/main">
+  <p:cSld>
+    <p:spTree>
+      <p:nvGrpSpPr>
+        <p:cNvPr id="1" name=""/>
+        <p:cNvGrpSpPr/>
+        <p:nvPr/>
+      </p:nvGrpSpPr>
+      <p:grpSpPr>
+        <a:xfrm>
+          <a:off x="0" y="0"/>
+          <a:ext cx="0" cy="0"/>
+          <a:chOff x="0" y="0"/>
+          <a:chExt cx="0" cy="0"/>
+        </a:xfrm>
+      </p:grpSpPr>
+      <p:sp>
+        <p:nvSpPr>
+          <p:cNvPr id="2" name="Title 1"/>
+          <p:cNvSpPr>
+            <a:spLocks noGrp="1"/>
+          </p:cNvSpPr>
+          <p:nvPr>
+            <p:ph type="title"/>
+          </p:nvPr>
+        </p:nvSpPr>
+        <p:spPr/>
+        <p:txBody>
+          <a:bodyPr/>
+          <a:lstStyle/>
+          <a:p>
+            <a:r>
+              <a:rPr lang="en-US" dirty="0" smtClean="0"/>
               <a:t>Let’s Look at Some Code</a:t>
             </a:r>
             <a:endParaRPr lang="en-US" dirty="0"/>
@@ -7369,7 +7831,7 @@
 </p:sld>
 </file>
 
-<file path=ppt/slides/slide18.xml><?xml version="1.0" encoding="utf-8"?>
+<file path=ppt/slides/slide19.xml><?xml version="1.0" encoding="utf-8"?>
 <p:sld xmlns:a="http://schemas.openxmlformats.org/drawingml/2006/main" xmlns:r="http://schemas.openxmlformats.org/officeDocument/2006/relationships" xmlns:p="http://schemas.openxmlformats.org/presentationml/2006/main">
   <p:cSld>
     <p:spTree>
@@ -7386,10 +7848,56 @@
           <a:chExt cx="0" cy="0"/>
         </a:xfrm>
       </p:grpSpPr>
+      <p:sp>
+        <p:nvSpPr>
+          <p:cNvPr id="2" name="Title 1"/>
+          <p:cNvSpPr>
+            <a:spLocks noGrp="1"/>
+          </p:cNvSpPr>
+          <p:nvPr>
+            <p:ph type="title"/>
+          </p:nvPr>
+        </p:nvSpPr>
+        <p:spPr/>
+        <p:txBody>
+          <a:bodyPr/>
+          <a:lstStyle/>
+          <a:p>
+            <a:r>
+              <a:rPr lang="en-US" dirty="0" smtClean="0"/>
+              <a:t>Q&amp;A</a:t>
+            </a:r>
+            <a:endParaRPr lang="en-US" dirty="0"/>
+          </a:p>
+        </p:txBody>
+      </p:sp>
+      <p:sp>
+        <p:nvSpPr>
+          <p:cNvPr id="3" name="Content Placeholder 2"/>
+          <p:cNvSpPr>
+            <a:spLocks noGrp="1"/>
+          </p:cNvSpPr>
+          <p:nvPr>
+            <p:ph sz="quarter" idx="13"/>
+          </p:nvPr>
+        </p:nvSpPr>
+        <p:spPr/>
+        <p:txBody>
+          <a:bodyPr/>
+          <a:lstStyle/>
+          <a:p>
+            <a:r>
+              <a:rPr lang="en-US" dirty="0" smtClean="0"/>
+              <a:t>Give me your best shot …</a:t>
+            </a:r>
+            <a:endParaRPr lang="en-US" dirty="0"/>
+          </a:p>
+        </p:txBody>
+      </p:sp>
     </p:spTree>
     <p:extLst>
       <p:ext uri="{BB962C8B-B14F-4D97-AF65-F5344CB8AC3E}">
-        <p14:creationId xmlns:p14="http://schemas.microsoft.com/office/powerpoint/2010/main" val="905356233"/>
+        <p14:creationId xmlns:p14="http://schemas.microsoft.com/office/powerpoint/2010/main" val="3015745230"/>
       </p:ext>
     </p:extLst>
   </p:cSld>
@@ -7469,6 +7977,13 @@
             </a:r>
           </a:p>
           <a:p>
+            <a:pPr lvl="1"/>
+            <a:r>
+              <a:rPr lang="en-US" dirty="0" smtClean="0"/>
+              <a:t>Note: it’s officially “Java 9”, not “Java 1.9”</a:t>
+            </a:r>
+          </a:p>
+          <a:p>
             <a:r>
               <a:rPr lang="en-US" dirty="0" smtClean="0"/>
               <a:t>Deeper Dive into Key Features</a:t>
@@ -7492,6 +8007,43 @@
     <p:extLst>
       <p:ext uri="{BB962C8B-B14F-4D97-AF65-F5344CB8AC3E}">
         <p14:creationId xmlns:p14="http://schemas.microsoft.com/office/powerpoint/2010/main" val="1663731767"/>
+      </p:ext>
+    </p:extLst>
+  </p:cSld>
+  <p:clrMapOvr>
+    <a:masterClrMapping/>
+  </p:clrMapOvr>
+  <p:timing>
+    <p:tnLst>
+      <p:par>
+        <p:cTn id="1" dur="indefinite" restart="never" nodeType="tmRoot"/>
+      </p:par>
+    </p:tnLst>
+  </p:timing>
+</p:sld>
+</file>
+
+<file path=ppt/slides/slide20.xml><?xml version="1.0" encoding="utf-8"?>
+<p:sld xmlns:a="http://schemas.openxmlformats.org/drawingml/2006/main" xmlns:r="http://schemas.openxmlformats.org/officeDocument/2006/relationships" xmlns:p="http://schemas.openxmlformats.org/presentationml/2006/main">
+  <p:cSld>
+    <p:spTree>
+      <p:nvGrpSpPr>
+        <p:cNvPr id="1" name=""/>
+        <p:cNvGrpSpPr/>
+        <p:nvPr/>
+      </p:nvGrpSpPr>
+      <p:grpSpPr>
+        <a:xfrm>
+          <a:off x="0" y="0"/>
+          <a:ext cx="0" cy="0"/>
+          <a:chOff x="0" y="0"/>
+          <a:chExt cx="0" cy="0"/>
+        </a:xfrm>
+      </p:grpSpPr>
+    </p:spTree>
+    <p:extLst>
+      <p:ext uri="{BB962C8B-B14F-4D97-AF65-F5344CB8AC3E}">
+        <p14:creationId xmlns:p14="http://schemas.microsoft.com/office/powerpoint/2010/main" val="905356233"/>
       </p:ext>
     </p:extLst>
   </p:cSld>
@@ -7611,11 +8163,7 @@
           <a:p>
             <a:r>
               <a:rPr lang="en-US" dirty="0" smtClean="0"/>
-              <a:t>Process </a:t>
-            </a:r>
-            <a:r>
-              <a:rPr lang="en-US" dirty="0" smtClean="0"/>
-              <a:t>API – deeper access to system-level processes  (JEP 102)</a:t>
+              <a:t>Process API – deeper access to system-level processes  (JEP 102)</a:t>
             </a:r>
           </a:p>
           <a:p>
@@ -7627,11 +8175,15 @@
           <a:p>
             <a:r>
               <a:rPr lang="en-US" dirty="0" smtClean="0"/>
-              <a:t>Milling project coin – minor language enhancements  (JEP 213</a:t>
-            </a:r>
-            <a:r>
-              <a:rPr lang="en-US" dirty="0" smtClean="0"/>
-              <a:t>)</a:t>
+              <a:t>HTTP </a:t>
+            </a:r>
+            <a:r>
+              <a:rPr lang="en-US" dirty="0"/>
+              <a:t>2 client  (JEP 110) – NOTE: “incubator” </a:t>
+            </a:r>
+            <a:r>
+              <a:rPr lang="en-US" dirty="0" smtClean="0"/>
+              <a:t>stage</a:t>
             </a:r>
           </a:p>
           <a:p>
@@ -7652,18 +8204,14 @@
               <a:t>Eval</a:t>
             </a:r>
             <a:r>
-              <a:rPr lang="en-US"/>
-              <a:t>-Print Loop  (JEP </a:t>
-            </a:r>
-            <a:r>
-              <a:rPr lang="en-US"/>
-              <a:t>222</a:t>
-            </a:r>
-            <a:r>
-              <a:rPr lang="en-US" smtClean="0"/>
+              <a:rPr lang="en-US" dirty="0"/>
+              <a:t>-Print Loop  (JEP 222</a:t>
+            </a:r>
+            <a:r>
+              <a:rPr lang="en-US" dirty="0" smtClean="0"/>
               <a:t>)</a:t>
             </a:r>
-            <a:endParaRPr lang="en-US"/>
+            <a:endParaRPr lang="en-US" dirty="0"/>
           </a:p>
         </p:txBody>
       </p:sp>
@@ -8065,77 +8613,81 @@
           <a:lstStyle/>
           <a:p>
             <a:r>
-              <a:rPr lang="en-US" dirty="0" smtClean="0"/>
-              <a:t>HTTP 2 client  (JEP 110) – NOTE: “incubator” stage</a:t>
-            </a:r>
-          </a:p>
-          <a:p>
-            <a:r>
-              <a:rPr lang="en-US" dirty="0" smtClean="0"/>
-              <a:t>Multi-release JAR files  (JEP 238)</a:t>
-            </a:r>
-          </a:p>
-          <a:p>
-            <a:r>
-              <a:rPr lang="en-US" dirty="0" smtClean="0"/>
+              <a:rPr lang="en-US" dirty="0"/>
+              <a:t>Milling project coin – minor language enhancements  (JEP 213)</a:t>
+            </a:r>
+          </a:p>
+          <a:p>
+            <a:r>
+              <a:rPr lang="en-US" dirty="0" smtClean="0"/>
+              <a:t>Support </a:t>
+            </a:r>
+            <a:r>
+              <a:rPr lang="en-US" dirty="0"/>
+              <a:t>UTF-8 property files  (JEP 226</a:t>
+            </a:r>
+            <a:r>
+              <a:rPr lang="en-US" dirty="0" smtClean="0"/>
+              <a:t>)</a:t>
+            </a:r>
+          </a:p>
+          <a:p>
+            <a:r>
+              <a:rPr lang="en-US" dirty="0"/>
               <a:t>Unicode 7.0, 8.0 support – about 10,000 new </a:t>
             </a:r>
             <a:r>
-              <a:rPr lang="en-US" dirty="0" err="1" smtClean="0"/>
+              <a:rPr lang="en-US" dirty="0" err="1"/>
               <a:t>codepoints</a:t>
             </a:r>
             <a:r>
-              <a:rPr lang="en-US" dirty="0" smtClean="0"/>
+              <a:rPr lang="en-US" dirty="0"/>
               <a:t>  (JEP 227, 267)</a:t>
             </a:r>
           </a:p>
           <a:p>
             <a:r>
               <a:rPr lang="en-US" dirty="0" smtClean="0"/>
-              <a:t>Java compilation control – “</a:t>
-            </a:r>
-            <a:r>
-              <a:rPr lang="en-US" i="1" dirty="0" err="1" smtClean="0"/>
-              <a:t>javac</a:t>
-            </a:r>
-            <a:r>
-              <a:rPr lang="en-US" dirty="0" smtClean="0"/>
-              <a:t>” tool  (JEP 165)</a:t>
-            </a:r>
-          </a:p>
-          <a:p>
-            <a:r>
-              <a:rPr lang="en-US" dirty="0" smtClean="0"/>
-              <a:t>Javadoc tool can generate HTML5 mark-up  (JEP 224)</a:t>
-            </a:r>
-          </a:p>
-          <a:p>
-            <a:r>
-              <a:rPr lang="en-US" dirty="0" smtClean="0"/>
-              <a:t>Support UTF-8 property files  (JEP 226)</a:t>
-            </a:r>
-          </a:p>
-          <a:p>
-            <a:r>
-              <a:rPr lang="en-US" dirty="0" smtClean="0"/>
-              <a:t>Parser API for “</a:t>
-            </a:r>
-            <a:r>
-              <a:rPr lang="en-US" dirty="0" err="1" smtClean="0"/>
-              <a:t>Nashorn</a:t>
-            </a:r>
-            <a:r>
-              <a:rPr lang="en-US" dirty="0" smtClean="0"/>
-              <a:t>” – </a:t>
-            </a:r>
-            <a:r>
-              <a:rPr lang="en-US" dirty="0" err="1" smtClean="0"/>
-              <a:t>Javascript</a:t>
-            </a:r>
-            <a:r>
-              <a:rPr lang="en-US" dirty="0" smtClean="0"/>
-              <a:t> Engine  (JEP 236)</a:t>
-            </a:r>
+              <a:t>Multi-release </a:t>
+            </a:r>
+            <a:r>
+              <a:rPr lang="en-US" dirty="0"/>
+              <a:t>JAR files  (JEP 238)</a:t>
+            </a:r>
+          </a:p>
+          <a:p>
+            <a:r>
+              <a:rPr lang="en-US" dirty="0"/>
+              <a:t>Make “G1” the default Garbage Collector  (JEP 248)</a:t>
+            </a:r>
+          </a:p>
+          <a:p>
+            <a:r>
+              <a:rPr lang="en-US" dirty="0"/>
+              <a:t>Compact “String” – internal representation only  (JEP 254</a:t>
+            </a:r>
+            <a:r>
+              <a:rPr lang="en-US" dirty="0" smtClean="0"/>
+              <a:t>)</a:t>
+            </a:r>
+          </a:p>
+          <a:p>
+            <a:r>
+              <a:rPr lang="en-US" dirty="0" smtClean="0"/>
+              <a:t>Ahead-of-time </a:t>
+            </a:r>
+            <a:r>
+              <a:rPr lang="en-US" dirty="0"/>
+              <a:t>(“AOT”) compilation – vs. “JIT”, or just-in-time  (JEP 295</a:t>
+            </a:r>
+            <a:r>
+              <a:rPr lang="en-US" dirty="0" smtClean="0"/>
+              <a:t>)</a:t>
+            </a:r>
+            <a:endParaRPr lang="en-US" dirty="0"/>
+          </a:p>
+          <a:p>
+            <a:endParaRPr lang="en-US" dirty="0"/>
           </a:p>
           <a:p>
             <a:endParaRPr lang="en-US" dirty="0"/>
@@ -8188,7 +8740,7 @@
                                         <p:tgtEl>
                                           <p:spTgt spid="3">
                                             <p:txEl>
-                                              <p:pRg st="1" end="1"/>
+                                              <p:pRg st="0" end="0"/>
                                             </p:txEl>
                                           </p:spTgt>
                                         </p:tgtEl>
@@ -8237,7 +8789,7 @@
                                         <p:tgtEl>
                                           <p:spTgt spid="3">
                                             <p:txEl>
-                                              <p:pRg st="2" end="2"/>
+                                              <p:pRg st="1" end="1"/>
                                             </p:txEl>
                                           </p:spTgt>
                                         </p:tgtEl>
@@ -8286,7 +8838,7 @@
                                         <p:tgtEl>
                                           <p:spTgt spid="3">
                                             <p:txEl>
-                                              <p:pRg st="3" end="3"/>
+                                              <p:pRg st="2" end="2"/>
                                             </p:txEl>
                                           </p:spTgt>
                                         </p:tgtEl>
@@ -8335,7 +8887,7 @@
                                         <p:tgtEl>
                                           <p:spTgt spid="3">
                                             <p:txEl>
-                                              <p:pRg st="4" end="4"/>
+                                              <p:pRg st="3" end="3"/>
                                             </p:txEl>
                                           </p:spTgt>
                                         </p:tgtEl>
@@ -8384,7 +8936,7 @@
                                         <p:tgtEl>
                                           <p:spTgt spid="3">
                                             <p:txEl>
-                                              <p:pRg st="5" end="5"/>
+                                              <p:pRg st="4" end="4"/>
                                             </p:txEl>
                                           </p:spTgt>
                                         </p:tgtEl>
@@ -8426,6 +8978,55 @@
                                     <p:set>
                                       <p:cBhvr>
                                         <p:cTn id="26" dur="1" fill="hold">
+                                          <p:stCondLst>
+                                            <p:cond delay="0"/>
+                                          </p:stCondLst>
+                                        </p:cTn>
+                                        <p:tgtEl>
+                                          <p:spTgt spid="3">
+                                            <p:txEl>
+                                              <p:pRg st="5" end="5"/>
+                                            </p:txEl>
+                                          </p:spTgt>
+                                        </p:tgtEl>
+                                        <p:attrNameLst>
+                                          <p:attrName>style.visibility</p:attrName>
+                                        </p:attrNameLst>
+                                      </p:cBhvr>
+                                      <p:to>
+                                        <p:strVal val="visible"/>
+                                      </p:to>
+                                    </p:set>
+                                  </p:childTnLst>
+                                </p:cTn>
+                              </p:par>
+                            </p:childTnLst>
+                          </p:cTn>
+                        </p:par>
+                      </p:childTnLst>
+                    </p:cTn>
+                  </p:par>
+                  <p:par>
+                    <p:cTn id="27" fill="hold">
+                      <p:stCondLst>
+                        <p:cond delay="indefinite"/>
+                      </p:stCondLst>
+                      <p:childTnLst>
+                        <p:par>
+                          <p:cTn id="28" fill="hold">
+                            <p:stCondLst>
+                              <p:cond delay="0"/>
+                            </p:stCondLst>
+                            <p:childTnLst>
+                              <p:par>
+                                <p:cTn id="29" presetID="1" presetClass="entr" presetSubtype="0" fill="hold" grpId="0" nodeType="clickEffect">
+                                  <p:stCondLst>
+                                    <p:cond delay="0"/>
+                                  </p:stCondLst>
+                                  <p:childTnLst>
+                                    <p:set>
+                                      <p:cBhvr>
+                                        <p:cTn id="30" dur="1" fill="hold">
                                           <p:stCondLst>
                                             <p:cond delay="0"/>
                                           </p:stCondLst>
@@ -8544,21 +9145,60 @@
           <a:lstStyle/>
           <a:p>
             <a:r>
-              <a:rPr lang="en-US" dirty="0" smtClean="0"/>
-              <a:t>Make “G1” the default Garbage Collector  (JEP 248)</a:t>
-            </a:r>
-          </a:p>
-          <a:p>
-            <a:r>
-              <a:rPr lang="en-US" dirty="0" smtClean="0"/>
-              <a:t>Compact “String” – internal representation only  (JEP 254)</a:t>
-            </a:r>
-          </a:p>
-          <a:p>
-            <a:r>
-              <a:rPr lang="en-US" dirty="0" smtClean="0"/>
-              <a:t>Encapsulate most internal API’s  (JEP 260)</a:t>
-            </a:r>
+              <a:rPr lang="en-US" dirty="0"/>
+              <a:t>Java compilation control – “</a:t>
+            </a:r>
+            <a:r>
+              <a:rPr lang="en-US" i="1" dirty="0" err="1"/>
+              <a:t>javac</a:t>
+            </a:r>
+            <a:r>
+              <a:rPr lang="en-US" dirty="0"/>
+              <a:t>” tool  (JEP 165)</a:t>
+            </a:r>
+          </a:p>
+          <a:p>
+            <a:r>
+              <a:rPr lang="en-US" dirty="0"/>
+              <a:t>Javadoc tool can generate HTML5 mark-up  (JEP 224)</a:t>
+            </a:r>
+          </a:p>
+          <a:p>
+            <a:r>
+              <a:rPr lang="en-US" dirty="0"/>
+              <a:t>Parser API for “</a:t>
+            </a:r>
+            <a:r>
+              <a:rPr lang="en-US" dirty="0" err="1"/>
+              <a:t>Nashorn</a:t>
+            </a:r>
+            <a:r>
+              <a:rPr lang="en-US" dirty="0"/>
+              <a:t>” – </a:t>
+            </a:r>
+            <a:r>
+              <a:rPr lang="en-US" dirty="0" err="1"/>
+              <a:t>Javascript</a:t>
+            </a:r>
+            <a:r>
+              <a:rPr lang="en-US" dirty="0"/>
+              <a:t> Engine  (JEP 236</a:t>
+            </a:r>
+            <a:r>
+              <a:rPr lang="en-US" dirty="0" smtClean="0"/>
+              <a:t>)</a:t>
+            </a:r>
+          </a:p>
+          <a:p>
+            <a:r>
+              <a:rPr lang="en-US" dirty="0"/>
+              <a:t>Encapsulate most internal API’s  (JEP 260</a:t>
+            </a:r>
+            <a:r>
+              <a:rPr lang="en-US" dirty="0" smtClean="0"/>
+              <a:t>)</a:t>
+            </a:r>
+            <a:endParaRPr lang="en-US" dirty="0"/>
           </a:p>
           <a:p>
             <a:r>
@@ -8584,12 +9224,6 @@
             <a:r>
               <a:rPr lang="en-US" dirty="0" smtClean="0"/>
               <a:t>” tool and API  (JEP 289)</a:t>
-            </a:r>
-          </a:p>
-          <a:p>
-            <a:r>
-              <a:rPr lang="en-US" dirty="0" smtClean="0"/>
-              <a:t>Ahead-of-time (“AOT”) compilation – vs. “JIT”, or just-in-time  (JEP 295)</a:t>
             </a:r>
           </a:p>
           <a:p>
@@ -8643,7 +9277,7 @@
                                         <p:tgtEl>
                                           <p:spTgt spid="3">
                                             <p:txEl>
-                                              <p:pRg st="1" end="1"/>
+                                              <p:pRg st="0" end="0"/>
                                             </p:txEl>
                                           </p:spTgt>
                                         </p:tgtEl>
@@ -8692,7 +9326,7 @@
                                         <p:tgtEl>
                                           <p:spTgt spid="3">
                                             <p:txEl>
-                                              <p:pRg st="2" end="2"/>
+                                              <p:pRg st="1" end="1"/>
                                             </p:txEl>
                                           </p:spTgt>
                                         </p:tgtEl>
@@ -8741,7 +9375,7 @@
                                         <p:tgtEl>
                                           <p:spTgt spid="3">
                                             <p:txEl>
-                                              <p:pRg st="3" end="3"/>
+                                              <p:pRg st="2" end="2"/>
                                             </p:txEl>
                                           </p:spTgt>
                                         </p:tgtEl>
@@ -8790,7 +9424,7 @@
                                         <p:tgtEl>
                                           <p:spTgt spid="3">
                                             <p:txEl>
-                                              <p:pRg st="4" end="4"/>
+                                              <p:pRg st="3" end="3"/>
                                             </p:txEl>
                                           </p:spTgt>
                                         </p:tgtEl>
@@ -8839,7 +9473,7 @@
                                         <p:tgtEl>
                                           <p:spTgt spid="3">
                                             <p:txEl>
-                                              <p:pRg st="5" end="5"/>
+                                              <p:pRg st="4" end="4"/>
                                             </p:txEl>
                                           </p:spTgt>
                                         </p:tgtEl>
@@ -8881,6 +9515,55 @@
                                     <p:set>
                                       <p:cBhvr>
                                         <p:cTn id="26" dur="1" fill="hold">
+                                          <p:stCondLst>
+                                            <p:cond delay="0"/>
+                                          </p:stCondLst>
+                                        </p:cTn>
+                                        <p:tgtEl>
+                                          <p:spTgt spid="3">
+                                            <p:txEl>
+                                              <p:pRg st="5" end="5"/>
+                                            </p:txEl>
+                                          </p:spTgt>
+                                        </p:tgtEl>
+                                        <p:attrNameLst>
+                                          <p:attrName>style.visibility</p:attrName>
+                                        </p:attrNameLst>
+                                      </p:cBhvr>
+                                      <p:to>
+                                        <p:strVal val="visible"/>
+                                      </p:to>
+                                    </p:set>
+                                  </p:childTnLst>
+                                </p:cTn>
+                              </p:par>
+                            </p:childTnLst>
+                          </p:cTn>
+                        </p:par>
+                      </p:childTnLst>
+                    </p:cTn>
+                  </p:par>
+                  <p:par>
+                    <p:cTn id="27" fill="hold">
+                      <p:stCondLst>
+                        <p:cond delay="indefinite"/>
+                      </p:stCondLst>
+                      <p:childTnLst>
+                        <p:par>
+                          <p:cTn id="28" fill="hold">
+                            <p:stCondLst>
+                              <p:cond delay="0"/>
+                            </p:stCondLst>
+                            <p:childTnLst>
+                              <p:par>
+                                <p:cTn id="29" presetID="1" presetClass="entr" presetSubtype="0" fill="hold" grpId="0" nodeType="clickEffect">
+                                  <p:stCondLst>
+                                    <p:cond delay="0"/>
+                                  </p:stCondLst>
+                                  <p:childTnLst>
+                                    <p:set>
+                                      <p:cBhvr>
+                                        <p:cTn id="30" dur="1" fill="hold">
                                           <p:stCondLst>
                                             <p:cond delay="0"/>
                                           </p:stCondLst>
@@ -9085,14 +9768,14 @@
             <a:pPr lvl="2"/>
             <a:r>
               <a:rPr lang="en-US" dirty="0" smtClean="0"/>
-              <a:t>Full Java9 JDK is 425 Mb</a:t>
+              <a:t>Full Java9 JDK is 490 Mb</a:t>
             </a:r>
           </a:p>
           <a:p>
             <a:pPr lvl="2"/>
             <a:r>
               <a:rPr lang="en-US" dirty="0" smtClean="0"/>
-              <a:t>Full Java9 JRE is 200 Mb</a:t>
+              <a:t>Full Java9 JRE is 205 Mb</a:t>
             </a:r>
           </a:p>
           <a:p>
@@ -9533,7 +10216,7 @@
             <a:pPr lvl="1" algn="just"/>
             <a:r>
               <a:rPr lang="en-US" dirty="0" smtClean="0"/>
-              <a:t>Kind of or mostly yes or no, depending on how you look at it</a:t>
+              <a:t>Kind of or mostly yes, depending on how you look at it</a:t>
             </a:r>
           </a:p>
         </p:txBody>
@@ -9866,11 +10549,11 @@
           <a:p>
             <a:r>
               <a:rPr lang="en-US" dirty="0" smtClean="0"/>
-              <a:t>Modularization affects these three </a:t>
-            </a:r>
-            <a:r>
-              <a:rPr lang="en-US" dirty="0" smtClean="0"/>
-              <a:t>facets:</a:t>
+              <a:t>Modularization affects </a:t>
+            </a:r>
+            <a:r>
+              <a:rPr lang="en-US" dirty="0" smtClean="0"/>
+              <a:t>three facets of Java development:</a:t>
             </a:r>
             <a:endParaRPr lang="en-US" dirty="0" smtClean="0"/>
           </a:p>
@@ -9880,7 +10563,6 @@
               <a:rPr lang="en-US" dirty="0" smtClean="0"/>
               <a:t>JDK and JRE</a:t>
             </a:r>
-            <a:endParaRPr lang="en-US" dirty="0" smtClean="0"/>
           </a:p>
           <a:p>
             <a:pPr lvl="1"/>
@@ -10552,11 +11234,11 @@
               <a:rPr lang="en-US" dirty="0" smtClean="0">
                 <a:hlinkClick r:id="rId3"/>
               </a:rPr>
-              <a:t>download.java.net/java/jdk9/docs/api/overview-summary.html</a:t>
-            </a:r>
-            <a:r>
-              <a:rPr lang="en-US" dirty="0" smtClean="0"/>
-              <a:t> </a:t>
+              <a:t>docs.oracle.com/javase/9/docs/api/overview-summary.html</a:t>
+            </a:r>
+            <a:r>
+              <a:rPr lang="en-US" dirty="0" smtClean="0"/>
+              <a:t>  </a:t>
             </a:r>
             <a:endParaRPr lang="en-US" dirty="0"/>
           </a:p>

</xml_diff>